<commit_message>
typo + Folie fürs routing
</commit_message>
<xml_diff>
--- a/Powerpoint v3.pptx
+++ b/Powerpoint v3.pptx
@@ -5,7 +5,7 @@
     <p:sldMasterId id="2147483648" r:id="rId1"/>
   </p:sldMasterIdLst>
   <p:notesMasterIdLst>
-    <p:notesMasterId r:id="rId39"/>
+    <p:notesMasterId r:id="rId40"/>
   </p:notesMasterIdLst>
   <p:sldIdLst>
     <p:sldId id="256" r:id="rId2"/>
@@ -35,16 +35,17 @@
     <p:sldId id="291" r:id="rId26"/>
     <p:sldId id="267" r:id="rId27"/>
     <p:sldId id="282" r:id="rId28"/>
-    <p:sldId id="281" r:id="rId29"/>
-    <p:sldId id="292" r:id="rId30"/>
-    <p:sldId id="269" r:id="rId31"/>
-    <p:sldId id="284" r:id="rId32"/>
-    <p:sldId id="285" r:id="rId33"/>
-    <p:sldId id="293" r:id="rId34"/>
-    <p:sldId id="271" r:id="rId35"/>
-    <p:sldId id="294" r:id="rId36"/>
-    <p:sldId id="283" r:id="rId37"/>
-    <p:sldId id="286" r:id="rId38"/>
+    <p:sldId id="304" r:id="rId29"/>
+    <p:sldId id="281" r:id="rId30"/>
+    <p:sldId id="292" r:id="rId31"/>
+    <p:sldId id="269" r:id="rId32"/>
+    <p:sldId id="284" r:id="rId33"/>
+    <p:sldId id="285" r:id="rId34"/>
+    <p:sldId id="293" r:id="rId35"/>
+    <p:sldId id="271" r:id="rId36"/>
+    <p:sldId id="294" r:id="rId37"/>
+    <p:sldId id="283" r:id="rId38"/>
+    <p:sldId id="286" r:id="rId39"/>
   </p:sldIdLst>
   <p:sldSz cx="12192000" cy="6858000"/>
   <p:notesSz cx="6858000" cy="9144000"/>
@@ -199,6 +200,7 @@
             <p14:sldId id="291"/>
             <p14:sldId id="267"/>
             <p14:sldId id="282"/>
+            <p14:sldId id="304"/>
             <p14:sldId id="281"/>
           </p14:sldIdLst>
         </p14:section>
@@ -318,7 +320,7 @@
           <a:p>
             <a:fld id="{6653C7EC-378C-496A-9946-B9D0B56795BD}" type="datetimeFigureOut">
               <a:rPr lang="en-CH" smtClean="0"/>
-              <a:t>07/01/2022</a:t>
+              <a:t>21/01/2022</a:t>
             </a:fld>
             <a:endParaRPr lang="en-CH"/>
           </a:p>
@@ -735,7 +737,7 @@
           <a:p>
             <a:fld id="{D71E13D6-B070-45C8-AC42-90F25AD4976F}" type="datetime8">
               <a:rPr lang="en-CH" smtClean="0"/>
-              <a:t>07/01/2022 09:12</a:t>
+              <a:t>21/01/2022 16:32</a:t>
             </a:fld>
             <a:endParaRPr lang="en-CH"/>
           </a:p>
@@ -935,7 +937,7 @@
           <a:p>
             <a:fld id="{34C1AEE4-2DCF-4A66-9927-6F783BB52BE0}" type="datetime8">
               <a:rPr lang="en-CH" smtClean="0"/>
-              <a:t>07/01/2022 09:12</a:t>
+              <a:t>21/01/2022 16:32</a:t>
             </a:fld>
             <a:endParaRPr lang="en-CH"/>
           </a:p>
@@ -1145,7 +1147,7 @@
           <a:p>
             <a:fld id="{C4C13A0D-7035-4256-BB1C-652F6CDC1D82}" type="datetime8">
               <a:rPr lang="en-CH" smtClean="0"/>
-              <a:t>07/01/2022 09:12</a:t>
+              <a:t>21/01/2022 16:32</a:t>
             </a:fld>
             <a:endParaRPr lang="en-CH"/>
           </a:p>
@@ -1345,7 +1347,7 @@
           <a:p>
             <a:fld id="{A720F8AA-53F4-4181-BD2C-7354613DB587}" type="datetime8">
               <a:rPr lang="en-CH" smtClean="0"/>
-              <a:t>07/01/2022 09:12</a:t>
+              <a:t>21/01/2022 16:32</a:t>
             </a:fld>
             <a:endParaRPr lang="en-CH"/>
           </a:p>
@@ -1621,7 +1623,7 @@
           <a:p>
             <a:fld id="{18ED5C57-181E-4E8A-8032-E5587C441532}" type="datetime8">
               <a:rPr lang="en-CH" smtClean="0"/>
-              <a:t>07/01/2022 09:12</a:t>
+              <a:t>21/01/2022 16:32</a:t>
             </a:fld>
             <a:endParaRPr lang="en-CH"/>
           </a:p>
@@ -1889,7 +1891,7 @@
           <a:p>
             <a:fld id="{2711B6E1-EBCF-4960-9E94-A2CE4CEDA9CF}" type="datetime8">
               <a:rPr lang="en-CH" smtClean="0"/>
-              <a:t>07/01/2022 09:12</a:t>
+              <a:t>21/01/2022 16:32</a:t>
             </a:fld>
             <a:endParaRPr lang="en-CH"/>
           </a:p>
@@ -2304,7 +2306,7 @@
           <a:p>
             <a:fld id="{60888D22-8975-4143-BBCD-F78A0E3504A0}" type="datetime8">
               <a:rPr lang="en-CH" smtClean="0"/>
-              <a:t>07/01/2022 09:12</a:t>
+              <a:t>21/01/2022 16:32</a:t>
             </a:fld>
             <a:endParaRPr lang="en-CH"/>
           </a:p>
@@ -2446,7 +2448,7 @@
           <a:p>
             <a:fld id="{CB62F5ED-9834-4FF8-A8E6-FE85BE4A88B6}" type="datetime8">
               <a:rPr lang="en-CH" smtClean="0"/>
-              <a:t>07/01/2022 09:12</a:t>
+              <a:t>21/01/2022 16:32</a:t>
             </a:fld>
             <a:endParaRPr lang="en-CH"/>
           </a:p>
@@ -2559,7 +2561,7 @@
           <a:p>
             <a:fld id="{91C4E595-669A-4DA7-8755-75BCB1DD65E9}" type="datetime8">
               <a:rPr lang="en-CH" smtClean="0"/>
-              <a:t>07/01/2022 09:12</a:t>
+              <a:t>21/01/2022 16:32</a:t>
             </a:fld>
             <a:endParaRPr lang="en-CH"/>
           </a:p>
@@ -2872,7 +2874,7 @@
           <a:p>
             <a:fld id="{1D3E9293-092D-4F3B-852B-B7B73C73F1F9}" type="datetime8">
               <a:rPr lang="en-CH" smtClean="0"/>
-              <a:t>07/01/2022 09:12</a:t>
+              <a:t>21/01/2022 16:32</a:t>
             </a:fld>
             <a:endParaRPr lang="en-CH"/>
           </a:p>
@@ -3161,7 +3163,7 @@
           <a:p>
             <a:fld id="{72DA9548-12AA-4712-AB6D-8087536C3BD4}" type="datetime8">
               <a:rPr lang="en-CH" smtClean="0"/>
-              <a:t>07/01/2022 09:12</a:t>
+              <a:t>21/01/2022 16:32</a:t>
             </a:fld>
             <a:endParaRPr lang="en-CH"/>
           </a:p>
@@ -3404,7 +3406,7 @@
           <a:p>
             <a:fld id="{361E5043-500B-4A06-A6BE-2D713F12E4A2}" type="datetime8">
               <a:rPr lang="en-CH" smtClean="0"/>
-              <a:t>07/01/2022 09:12</a:t>
+              <a:t>21/01/2022 16:32</a:t>
             </a:fld>
             <a:endParaRPr lang="en-CH"/>
           </a:p>
@@ -4600,9 +4602,10 @@
           <a:p>
             <a:pPr lvl="1"/>
             <a:r>
-              <a:rPr lang="en-US" dirty="0"/>
-              <a:t>Images</a:t>
-            </a:r>
+              <a:rPr lang="en-US" dirty="0" err="1"/>
+              <a:t>Bilder</a:t>
+            </a:r>
+            <a:endParaRPr lang="en-US" dirty="0"/>
           </a:p>
           <a:p>
             <a:pPr lvl="1"/>
@@ -5699,7 +5702,7 @@
             </a:r>
             <a:r>
               <a:rPr lang="en-US" dirty="0" err="1"/>
-              <a:t>bibliothek</a:t>
+              <a:t>Bibliothek</a:t>
             </a:r>
             <a:r>
               <a:rPr lang="en-US" dirty="0"/>
@@ -5963,7 +5966,7 @@
             </a:r>
             <a:r>
               <a:rPr lang="en-US" dirty="0" err="1"/>
-              <a:t>bibliothek</a:t>
+              <a:t>Bibliothek</a:t>
             </a:r>
             <a:endParaRPr lang="en-US" dirty="0"/>
           </a:p>
@@ -6011,8 +6014,12 @@
           <a:p>
             <a:pPr lvl="1"/>
             <a:r>
+              <a:rPr lang="en-US" dirty="0" err="1"/>
+              <a:t>Daten</a:t>
+            </a:r>
+            <a:r>
               <a:rPr lang="en-US" dirty="0"/>
-              <a:t>Data in DB </a:t>
+              <a:t> in DB </a:t>
             </a:r>
             <a:r>
               <a:rPr lang="en-US" dirty="0" err="1"/>
@@ -6023,8 +6030,12 @@
           <a:p>
             <a:pPr lvl="1"/>
             <a:r>
+              <a:rPr lang="en-US" dirty="0" err="1"/>
+              <a:t>Daten</a:t>
+            </a:r>
+            <a:r>
               <a:rPr lang="en-US" dirty="0"/>
-              <a:t>Data von DB </a:t>
+              <a:t> von DB </a:t>
             </a:r>
             <a:r>
               <a:rPr lang="en-US" dirty="0" err="1"/>
@@ -6035,16 +6046,19 @@
           <a:p>
             <a:pPr lvl="1"/>
             <a:r>
+              <a:rPr lang="en-US" dirty="0"/>
+              <a:t>Plots</a:t>
+            </a:r>
+          </a:p>
+          <a:p>
+            <a:pPr lvl="1"/>
+            <a:r>
               <a:rPr lang="en-US" dirty="0" err="1"/>
-              <a:t>Graphen</a:t>
-            </a:r>
-            <a:endParaRPr lang="en-US" dirty="0"/>
-          </a:p>
-          <a:p>
-            <a:pPr lvl="1"/>
+              <a:t>Vorhersagen</a:t>
+            </a:r>
             <a:r>
               <a:rPr lang="en-US" dirty="0"/>
-              <a:t>Prediction (Nearest </a:t>
+              <a:t> (Nearest </a:t>
             </a:r>
             <a:r>
               <a:rPr lang="en-US" dirty="0" err="1"/>
@@ -6746,7 +6760,7 @@
           <a:p>
             <a:r>
               <a:rPr lang="en-US" dirty="0" err="1"/>
-              <a:t>Komplett</a:t>
+              <a:t>Selbst</a:t>
             </a:r>
             <a:r>
               <a:rPr lang="en-US" dirty="0"/>
@@ -6754,14 +6768,6 @@
             </a:r>
             <a:r>
               <a:rPr lang="en-US" dirty="0" err="1"/>
-              <a:t>selbst</a:t>
-            </a:r>
-            <a:r>
-              <a:rPr lang="en-US" dirty="0"/>
-              <a:t> </a:t>
-            </a:r>
-            <a:r>
-              <a:rPr lang="en-US" dirty="0" err="1"/>
               <a:t>entwickelt</a:t>
             </a:r>
             <a:endParaRPr lang="en-US" dirty="0"/>
@@ -6773,7 +6779,7 @@
             </a:r>
             <a:r>
               <a:rPr lang="en-US" dirty="0" err="1"/>
-              <a:t>Neighour</a:t>
+              <a:t>Neigbhour</a:t>
             </a:r>
             <a:endParaRPr lang="en-US" dirty="0"/>
           </a:p>
@@ -13101,7 +13107,7 @@
                 <a:latin typeface="Arial" panose="020B0604020202020204" pitchFamily="34" charset="0"/>
                 <a:cs typeface="Arial" panose="020B0604020202020204" pitchFamily="34" charset="0"/>
               </a:rPr>
-              <a:t>logging</a:t>
+              <a:t>Logging</a:t>
             </a:r>
             <a:endParaRPr lang="en-CH" dirty="0"/>
           </a:p>
@@ -13138,7 +13144,15 @@
             </a:r>
             <a:r>
               <a:rPr lang="en-US" dirty="0"/>
-              <a:t> warden diverse </a:t>
+              <a:t> </a:t>
+            </a:r>
+            <a:r>
+              <a:rPr lang="en-US" dirty="0" err="1"/>
+              <a:t>werden</a:t>
+            </a:r>
+            <a:r>
+              <a:rPr lang="en-US" dirty="0"/>
+              <a:t> diverse </a:t>
             </a:r>
             <a:r>
               <a:rPr lang="en-US" dirty="0" err="1"/>
@@ -13435,7 +13449,7 @@
                 <a:latin typeface="Arial" panose="020B0604020202020204" pitchFamily="34" charset="0"/>
                 <a:cs typeface="Arial" panose="020B0604020202020204" pitchFamily="34" charset="0"/>
               </a:rPr>
-              <a:t>threading</a:t>
+              <a:t>Threading</a:t>
             </a:r>
             <a:endParaRPr lang="en-CH" dirty="0"/>
           </a:p>
@@ -13464,7 +13478,7 @@
           <a:p>
             <a:r>
               <a:rPr lang="en-US" dirty="0"/>
-              <a:t>Main thread für Plots</a:t>
+              <a:t>Main Thread für Plots</a:t>
             </a:r>
           </a:p>
           <a:p>
@@ -13476,8 +13490,29 @@
           <a:p>
             <a:r>
               <a:rPr lang="en-US" dirty="0"/>
-              <a:t>Thread für Date List</a:t>
-            </a:r>
+              <a:t>Thread um </a:t>
+            </a:r>
+            <a:r>
+              <a:rPr lang="en-US" dirty="0" err="1"/>
+              <a:t>Wetterdaten</a:t>
+            </a:r>
+            <a:r>
+              <a:rPr lang="en-US" dirty="0"/>
+              <a:t> </a:t>
+            </a:r>
+            <a:r>
+              <a:rPr lang="en-US" dirty="0" err="1"/>
+              <a:t>zu</a:t>
+            </a:r>
+            <a:r>
+              <a:rPr lang="en-US" dirty="0"/>
+              <a:t> </a:t>
+            </a:r>
+            <a:r>
+              <a:rPr lang="en-US" dirty="0" err="1"/>
+              <a:t>aktualisieren</a:t>
+            </a:r>
+            <a:endParaRPr lang="en-US" dirty="0"/>
           </a:p>
           <a:p>
             <a:endParaRPr lang="en-CH" dirty="0"/>
@@ -13752,11 +13787,11 @@
               </a:rPr>
             </a:br>
             <a:r>
-              <a:rPr lang="en-US" sz="3600" i="1" dirty="0">
-                <a:latin typeface="Arial" panose="020B0604020202020204" pitchFamily="34" charset="0"/>
-                <a:cs typeface="Arial" panose="020B0604020202020204" pitchFamily="34" charset="0"/>
-              </a:rPr>
-              <a:t>Graphs</a:t>
+              <a:rPr lang="en-US" sz="3600" i="1" dirty="0" err="1">
+                <a:latin typeface="Arial" panose="020B0604020202020204" pitchFamily="34" charset="0"/>
+                <a:cs typeface="Arial" panose="020B0604020202020204" pitchFamily="34" charset="0"/>
+              </a:rPr>
+              <a:t>Grafiken</a:t>
             </a:r>
             <a:endParaRPr lang="en-CH" dirty="0"/>
           </a:p>
@@ -14715,15 +14750,7 @@
           <a:p>
             <a:r>
               <a:rPr lang="en-US" dirty="0"/>
-              <a:t>Flask </a:t>
-            </a:r>
-            <a:r>
-              <a:rPr lang="en-US" dirty="0" err="1"/>
-              <a:t>pyhton</a:t>
-            </a:r>
-            <a:r>
-              <a:rPr lang="en-US" dirty="0"/>
-              <a:t> Package</a:t>
+              <a:t>Flask Python Package</a:t>
             </a:r>
           </a:p>
           <a:p>
@@ -15814,6 +15841,430 @@
                 <a:latin typeface="Arial" panose="020B0604020202020204" pitchFamily="34" charset="0"/>
                 <a:cs typeface="Arial" panose="020B0604020202020204" pitchFamily="34" charset="0"/>
               </a:rPr>
+              <a:t>routing in main.py</a:t>
+            </a:r>
+            <a:endParaRPr lang="en-CH" dirty="0"/>
+          </a:p>
+        </p:txBody>
+      </p:sp>
+      <p:sp>
+        <p:nvSpPr>
+          <p:cNvPr id="4" name="Slide Number Placeholder 3">
+            <a:extLst>
+              <a:ext uri="{FF2B5EF4-FFF2-40B4-BE49-F238E27FC236}">
+                <a16:creationId xmlns:a16="http://schemas.microsoft.com/office/drawing/2014/main" id="{25E7D99B-055F-46C1-9ED3-2255A4486B53}"/>
+              </a:ext>
+            </a:extLst>
+          </p:cNvPr>
+          <p:cNvSpPr>
+            <a:spLocks noGrp="1"/>
+          </p:cNvSpPr>
+          <p:nvPr>
+            <p:ph type="sldNum" sz="quarter" idx="12"/>
+          </p:nvPr>
+        </p:nvSpPr>
+        <p:spPr/>
+        <p:txBody>
+          <a:bodyPr/>
+          <a:lstStyle/>
+          <a:p>
+            <a:fld id="{0F00D740-55B1-4DC8-A3B5-4535950A93D0}" type="slidenum">
+              <a:rPr lang="en-CH" smtClean="0"/>
+              <a:t>28</a:t>
+            </a:fld>
+            <a:endParaRPr lang="en-CH"/>
+          </a:p>
+        </p:txBody>
+      </p:sp>
+      <p:grpSp>
+        <p:nvGrpSpPr>
+          <p:cNvPr id="5" name="Group 4">
+            <a:extLst>
+              <a:ext uri="{FF2B5EF4-FFF2-40B4-BE49-F238E27FC236}">
+                <a16:creationId xmlns:a16="http://schemas.microsoft.com/office/drawing/2014/main" id="{4EC58CAD-48B2-4835-9E3B-91425F5E9895}"/>
+              </a:ext>
+            </a:extLst>
+          </p:cNvPr>
+          <p:cNvGrpSpPr/>
+          <p:nvPr/>
+        </p:nvGrpSpPr>
+        <p:grpSpPr>
+          <a:xfrm>
+            <a:off x="8990330" y="5808980"/>
+            <a:ext cx="3774440" cy="764540"/>
+            <a:chOff x="8990330" y="5808980"/>
+            <a:chExt cx="3774440" cy="764540"/>
+          </a:xfrm>
+        </p:grpSpPr>
+        <p:pic>
+          <p:nvPicPr>
+            <p:cNvPr id="6" name="Picture 5">
+              <a:extLst>
+                <a:ext uri="{FF2B5EF4-FFF2-40B4-BE49-F238E27FC236}">
+                  <a16:creationId xmlns:a16="http://schemas.microsoft.com/office/drawing/2014/main" id="{022721ED-DE7C-4BE7-8FB8-448D5A1D2FA3}"/>
+                </a:ext>
+              </a:extLst>
+            </p:cNvPr>
+            <p:cNvPicPr>
+              <a:picLocks noChangeAspect="1"/>
+            </p:cNvPicPr>
+            <p:nvPr/>
+          </p:nvPicPr>
+          <p:blipFill>
+            <a:blip r:embed="rId2" cstate="print">
+              <a:extLst>
+                <a:ext uri="{28A0092B-C50C-407E-A947-70E740481C1C}">
+                  <a14:useLocalDpi xmlns:a14="http://schemas.microsoft.com/office/drawing/2010/main" val="0"/>
+                </a:ext>
+              </a:extLst>
+            </a:blip>
+            <a:srcRect/>
+            <a:stretch>
+              <a:fillRect/>
+            </a:stretch>
+          </p:blipFill>
+          <p:spPr bwMode="auto">
+            <a:xfrm>
+              <a:off x="8990330" y="5808980"/>
+              <a:ext cx="942340" cy="558800"/>
+            </a:xfrm>
+            <a:prstGeom prst="rect">
+              <a:avLst/>
+            </a:prstGeom>
+            <a:noFill/>
+            <a:ln>
+              <a:noFill/>
+            </a:ln>
+          </p:spPr>
+        </p:pic>
+        <p:sp>
+          <p:nvSpPr>
+            <p:cNvPr id="7" name="Text Box 11">
+              <a:extLst>
+                <a:ext uri="{FF2B5EF4-FFF2-40B4-BE49-F238E27FC236}">
+                  <a16:creationId xmlns:a16="http://schemas.microsoft.com/office/drawing/2014/main" id="{D3B6ED79-9CCE-4997-8EDA-DFDF7934B22B}"/>
+                </a:ext>
+              </a:extLst>
+            </p:cNvPr>
+            <p:cNvSpPr txBox="1"/>
+            <p:nvPr/>
+          </p:nvSpPr>
+          <p:spPr>
+            <a:xfrm>
+              <a:off x="9999980" y="5923280"/>
+              <a:ext cx="2764790" cy="650240"/>
+            </a:xfrm>
+            <a:prstGeom prst="rect">
+              <a:avLst/>
+            </a:prstGeom>
+            <a:noFill/>
+            <a:ln w="6350">
+              <a:noFill/>
+            </a:ln>
+          </p:spPr>
+          <p:txBody>
+            <a:bodyPr rot="0" spcFirstLastPara="0" vert="horz" wrap="square" lIns="91440" tIns="45720" rIns="91440" bIns="45720" numCol="1" spcCol="0" rtlCol="0" fromWordArt="0" anchor="t" anchorCtr="0" forceAA="0" compatLnSpc="1">
+              <a:prstTxWarp prst="textNoShape">
+                <a:avLst/>
+              </a:prstTxWarp>
+              <a:noAutofit/>
+            </a:bodyPr>
+            <a:lstStyle/>
+            <a:p>
+              <a:pPr>
+                <a:lnSpc>
+                  <a:spcPct val="115000"/>
+                </a:lnSpc>
+              </a:pPr>
+              <a:r>
+                <a:rPr lang="en-US" sz="900" b="1">
+                  <a:solidFill>
+                    <a:srgbClr val="44546A"/>
+                  </a:solidFill>
+                  <a:effectLst/>
+                  <a:latin typeface="Calibri" panose="020F0502020204030204" pitchFamily="34" charset="0"/>
+                  <a:ea typeface="Times New Roman" panose="02020603050405020304" pitchFamily="18" charset="0"/>
+                  <a:cs typeface="Times New Roman" panose="02020603050405020304" pitchFamily="18" charset="0"/>
+                </a:rPr>
+                <a:t>Fachhochschule Nordwestschweiz</a:t>
+              </a:r>
+              <a:endParaRPr lang="en-CH" sz="1400" b="1">
+                <a:solidFill>
+                  <a:srgbClr val="44546A"/>
+                </a:solidFill>
+                <a:effectLst/>
+                <a:latin typeface="Calibri" panose="020F0502020204030204" pitchFamily="34" charset="0"/>
+                <a:ea typeface="Times New Roman" panose="02020603050405020304" pitchFamily="18" charset="0"/>
+                <a:cs typeface="Times New Roman" panose="02020603050405020304" pitchFamily="18" charset="0"/>
+              </a:endParaRPr>
+            </a:p>
+            <a:p>
+              <a:pPr>
+                <a:lnSpc>
+                  <a:spcPct val="115000"/>
+                </a:lnSpc>
+              </a:pPr>
+              <a:r>
+                <a:rPr lang="en-US" sz="900" b="1">
+                  <a:solidFill>
+                    <a:srgbClr val="44546A"/>
+                  </a:solidFill>
+                  <a:effectLst/>
+                  <a:latin typeface="Calibri" panose="020F0502020204030204" pitchFamily="34" charset="0"/>
+                  <a:ea typeface="Times New Roman" panose="02020603050405020304" pitchFamily="18" charset="0"/>
+                  <a:cs typeface="Times New Roman" panose="02020603050405020304" pitchFamily="18" charset="0"/>
+                </a:rPr>
+                <a:t>Hochschule für Technik</a:t>
+              </a:r>
+              <a:endParaRPr lang="en-CH" sz="1400" b="1">
+                <a:solidFill>
+                  <a:srgbClr val="44546A"/>
+                </a:solidFill>
+                <a:effectLst/>
+                <a:latin typeface="Calibri" panose="020F0502020204030204" pitchFamily="34" charset="0"/>
+                <a:ea typeface="Times New Roman" panose="02020603050405020304" pitchFamily="18" charset="0"/>
+                <a:cs typeface="Times New Roman" panose="02020603050405020304" pitchFamily="18" charset="0"/>
+              </a:endParaRPr>
+            </a:p>
+          </p:txBody>
+        </p:sp>
+      </p:grpSp>
+      <p:sp>
+        <p:nvSpPr>
+          <p:cNvPr id="23" name="Content Placeholder 2">
+            <a:extLst>
+              <a:ext uri="{FF2B5EF4-FFF2-40B4-BE49-F238E27FC236}">
+                <a16:creationId xmlns:a16="http://schemas.microsoft.com/office/drawing/2014/main" id="{075865A9-A72A-4315-A8EE-F069188AD505}"/>
+              </a:ext>
+            </a:extLst>
+          </p:cNvPr>
+          <p:cNvSpPr>
+            <a:spLocks noGrp="1"/>
+          </p:cNvSpPr>
+          <p:nvPr>
+            <p:ph idx="1"/>
+          </p:nvPr>
+        </p:nvSpPr>
+        <p:spPr>
+          <a:xfrm>
+            <a:off x="838200" y="1825625"/>
+            <a:ext cx="10515600" cy="4351338"/>
+          </a:xfrm>
+        </p:spPr>
+        <p:txBody>
+          <a:bodyPr/>
+          <a:lstStyle/>
+          <a:p>
+            <a:r>
+              <a:rPr lang="en-US" dirty="0"/>
+              <a:t>/</a:t>
+            </a:r>
+          </a:p>
+          <a:p>
+            <a:pPr lvl="1"/>
+            <a:r>
+              <a:rPr lang="en-US" dirty="0"/>
+              <a:t>Redirect to /</a:t>
+            </a:r>
+            <a:r>
+              <a:rPr lang="en-US" dirty="0" err="1"/>
+              <a:t>wetterstation</a:t>
+            </a:r>
+            <a:r>
+              <a:rPr lang="en-US" dirty="0"/>
+              <a:t>/</a:t>
+            </a:r>
+            <a:r>
+              <a:rPr lang="en-US" dirty="0" err="1"/>
+              <a:t>tiefenbrunnen</a:t>
+            </a:r>
+            <a:endParaRPr lang="en-US" dirty="0"/>
+          </a:p>
+          <a:p>
+            <a:r>
+              <a:rPr lang="en-US" dirty="0"/>
+              <a:t>/</a:t>
+            </a:r>
+            <a:r>
+              <a:rPr lang="en-US" dirty="0" err="1"/>
+              <a:t>wetterstation</a:t>
+            </a:r>
+            <a:r>
+              <a:rPr lang="en-US" dirty="0"/>
+              <a:t>/&lt;station&gt;</a:t>
+            </a:r>
+          </a:p>
+          <a:p>
+            <a:pPr lvl="1"/>
+            <a:r>
+              <a:rPr lang="en-US" dirty="0" err="1"/>
+              <a:t>Übersichtsseite</a:t>
+            </a:r>
+            <a:r>
+              <a:rPr lang="en-US" dirty="0"/>
+              <a:t> </a:t>
+            </a:r>
+            <a:r>
+              <a:rPr lang="en-US" dirty="0" err="1"/>
+              <a:t>Messstation</a:t>
+            </a:r>
+            <a:endParaRPr lang="en-US" dirty="0"/>
+          </a:p>
+          <a:p>
+            <a:endParaRPr lang="en-US" dirty="0"/>
+          </a:p>
+          <a:p>
+            <a:r>
+              <a:rPr lang="en-US" dirty="0"/>
+              <a:t>/</a:t>
+            </a:r>
+            <a:r>
+              <a:rPr lang="en-US" dirty="0" err="1"/>
+              <a:t>wetterstation</a:t>
+            </a:r>
+            <a:r>
+              <a:rPr lang="en-US" dirty="0"/>
+              <a:t>/&lt;station&gt;/&lt;category&gt;</a:t>
+            </a:r>
+          </a:p>
+          <a:p>
+            <a:pPr lvl="1"/>
+            <a:r>
+              <a:rPr lang="en-US" dirty="0" err="1"/>
+              <a:t>Leitet</a:t>
+            </a:r>
+            <a:r>
+              <a:rPr lang="en-US" dirty="0"/>
+              <a:t> </a:t>
+            </a:r>
+            <a:r>
+              <a:rPr lang="en-US" dirty="0" err="1"/>
+              <a:t>weiter</a:t>
+            </a:r>
+            <a:r>
+              <a:rPr lang="en-US" dirty="0"/>
+              <a:t> auf /</a:t>
+            </a:r>
+            <a:r>
+              <a:rPr lang="en-US" dirty="0" err="1"/>
+              <a:t>wetterstation</a:t>
+            </a:r>
+            <a:r>
+              <a:rPr lang="en-US" dirty="0"/>
+              <a:t>/&lt;station&gt;/&lt;category&gt;/history</a:t>
+            </a:r>
+          </a:p>
+          <a:p>
+            <a:r>
+              <a:rPr lang="en-US" dirty="0"/>
+              <a:t>/</a:t>
+            </a:r>
+            <a:r>
+              <a:rPr lang="en-US" dirty="0" err="1"/>
+              <a:t>wetterstation</a:t>
+            </a:r>
+            <a:r>
+              <a:rPr lang="en-US" dirty="0"/>
+              <a:t>/&lt;station&gt;/&lt;category&gt;/&lt;type&gt;</a:t>
+            </a:r>
+          </a:p>
+          <a:p>
+            <a:pPr lvl="1"/>
+            <a:r>
+              <a:rPr lang="en-US" dirty="0" err="1"/>
+              <a:t>Grafik</a:t>
+            </a:r>
+            <a:endParaRPr lang="en-US" dirty="0"/>
+          </a:p>
+          <a:p>
+            <a:pPr lvl="1"/>
+            <a:endParaRPr lang="en-CH" dirty="0"/>
+          </a:p>
+        </p:txBody>
+      </p:sp>
+    </p:spTree>
+    <p:extLst>
+      <p:ext uri="{BB962C8B-B14F-4D97-AF65-F5344CB8AC3E}">
+        <p14:creationId xmlns:p14="http://schemas.microsoft.com/office/powerpoint/2010/main" val="2477391125"/>
+      </p:ext>
+    </p:extLst>
+  </p:cSld>
+  <p:clrMapOvr>
+    <a:masterClrMapping/>
+  </p:clrMapOvr>
+  <mc:AlternateContent xmlns:mc="http://schemas.openxmlformats.org/markup-compatibility/2006" xmlns:p14="http://schemas.microsoft.com/office/powerpoint/2010/main">
+    <mc:Choice Requires="p14">
+      <p:transition spd="med" p14:dur="700">
+        <p:fade/>
+      </p:transition>
+    </mc:Choice>
+    <mc:Fallback xmlns="">
+      <p:transition spd="med">
+        <p:fade/>
+      </p:transition>
+    </mc:Fallback>
+  </mc:AlternateContent>
+</p:sld>
+</file>
+
+<file path=ppt/slides/slide29.xml><?xml version="1.0" encoding="utf-8"?>
+<p:sld xmlns:a="http://schemas.openxmlformats.org/drawingml/2006/main" xmlns:r="http://schemas.openxmlformats.org/officeDocument/2006/relationships" xmlns:p="http://schemas.openxmlformats.org/presentationml/2006/main">
+  <p:cSld>
+    <p:spTree>
+      <p:nvGrpSpPr>
+        <p:cNvPr id="1" name=""/>
+        <p:cNvGrpSpPr/>
+        <p:nvPr/>
+      </p:nvGrpSpPr>
+      <p:grpSpPr>
+        <a:xfrm>
+          <a:off x="0" y="0"/>
+          <a:ext cx="0" cy="0"/>
+          <a:chOff x="0" y="0"/>
+          <a:chExt cx="0" cy="0"/>
+        </a:xfrm>
+      </p:grpSpPr>
+      <p:sp>
+        <p:nvSpPr>
+          <p:cNvPr id="2" name="Title 1">
+            <a:extLst>
+              <a:ext uri="{FF2B5EF4-FFF2-40B4-BE49-F238E27FC236}">
+                <a16:creationId xmlns:a16="http://schemas.microsoft.com/office/drawing/2014/main" id="{4808087A-40EC-41E6-A246-BC46343A4BFC}"/>
+              </a:ext>
+            </a:extLst>
+          </p:cNvPr>
+          <p:cNvSpPr>
+            <a:spLocks noGrp="1"/>
+          </p:cNvSpPr>
+          <p:nvPr>
+            <p:ph type="title"/>
+          </p:nvPr>
+        </p:nvSpPr>
+        <p:spPr/>
+        <p:txBody>
+          <a:bodyPr>
+            <a:normAutofit/>
+          </a:bodyPr>
+          <a:lstStyle/>
+          <a:p>
+            <a:r>
+              <a:rPr lang="en-US" b="1" dirty="0">
+                <a:latin typeface="Arial" panose="020B0604020202020204" pitchFamily="34" charset="0"/>
+                <a:cs typeface="Arial" panose="020B0604020202020204" pitchFamily="34" charset="0"/>
+              </a:rPr>
+              <a:t>Flask Webserver</a:t>
+            </a:r>
+            <a:br>
+              <a:rPr lang="en-US" b="1" dirty="0">
+                <a:latin typeface="Arial" panose="020B0604020202020204" pitchFamily="34" charset="0"/>
+                <a:cs typeface="Arial" panose="020B0604020202020204" pitchFamily="34" charset="0"/>
+              </a:rPr>
+            </a:br>
+            <a:r>
+              <a:rPr lang="en-US" sz="3600" i="1" dirty="0">
+                <a:latin typeface="Arial" panose="020B0604020202020204" pitchFamily="34" charset="0"/>
+                <a:cs typeface="Arial" panose="020B0604020202020204" pitchFamily="34" charset="0"/>
+              </a:rPr>
               <a:t>html files</a:t>
             </a:r>
             <a:endParaRPr lang="en-CH" dirty="0"/>
@@ -16066,7 +16517,7 @@
           <a:p>
             <a:fld id="{0F00D740-55B1-4DC8-A3B5-4535950A93D0}" type="slidenum">
               <a:rPr lang="en-CH" smtClean="0"/>
-              <a:t>28</a:t>
+              <a:t>29</a:t>
             </a:fld>
             <a:endParaRPr lang="en-CH"/>
           </a:p>
@@ -16250,228 +16701,6 @@
 </p:sld>
 </file>
 
-<file path=ppt/slides/slide29.xml><?xml version="1.0" encoding="utf-8"?>
-<p:sld xmlns:a="http://schemas.openxmlformats.org/drawingml/2006/main" xmlns:r="http://schemas.openxmlformats.org/officeDocument/2006/relationships" xmlns:p="http://schemas.openxmlformats.org/presentationml/2006/main">
-  <p:cSld>
-    <p:spTree>
-      <p:nvGrpSpPr>
-        <p:cNvPr id="1" name=""/>
-        <p:cNvGrpSpPr/>
-        <p:nvPr/>
-      </p:nvGrpSpPr>
-      <p:grpSpPr>
-        <a:xfrm>
-          <a:off x="0" y="0"/>
-          <a:ext cx="0" cy="0"/>
-          <a:chOff x="0" y="0"/>
-          <a:chExt cx="0" cy="0"/>
-        </a:xfrm>
-      </p:grpSpPr>
-      <p:sp>
-        <p:nvSpPr>
-          <p:cNvPr id="2" name="Title 1">
-            <a:extLst>
-              <a:ext uri="{FF2B5EF4-FFF2-40B4-BE49-F238E27FC236}">
-                <a16:creationId xmlns:a16="http://schemas.microsoft.com/office/drawing/2014/main" id="{F1AE8F4F-038B-4ABA-A89F-CA33847A9E12}"/>
-              </a:ext>
-            </a:extLst>
-          </p:cNvPr>
-          <p:cNvSpPr>
-            <a:spLocks noGrp="1"/>
-          </p:cNvSpPr>
-          <p:nvPr>
-            <p:ph type="title"/>
-          </p:nvPr>
-        </p:nvSpPr>
-        <p:spPr>
-          <a:xfrm>
-            <a:off x="838200" y="365125"/>
-            <a:ext cx="10515600" cy="5702300"/>
-          </a:xfrm>
-        </p:spPr>
-        <p:txBody>
-          <a:bodyPr>
-            <a:normAutofit fontScale="90000"/>
-          </a:bodyPr>
-          <a:lstStyle/>
-          <a:p>
-            <a:pPr algn="ctr">
-              <a:lnSpc>
-                <a:spcPct val="125000"/>
-              </a:lnSpc>
-              <a:spcBef>
-                <a:spcPts val="0"/>
-              </a:spcBef>
-            </a:pPr>
-            <a:r>
-              <a:rPr lang="en-US" b="1" dirty="0" err="1">
-                <a:latin typeface="Arial" panose="020B0604020202020204" pitchFamily="34" charset="0"/>
-                <a:cs typeface="Arial" panose="020B0604020202020204" pitchFamily="34" charset="0"/>
-              </a:rPr>
-              <a:t>Auftrag</a:t>
-            </a:r>
-            <a:br>
-              <a:rPr lang="en-US" b="1" dirty="0">
-                <a:latin typeface="Arial" panose="020B0604020202020204" pitchFamily="34" charset="0"/>
-                <a:cs typeface="Arial" panose="020B0604020202020204" pitchFamily="34" charset="0"/>
-              </a:rPr>
-            </a:br>
-            <a:r>
-              <a:rPr lang="en-US" b="1" dirty="0">
-                <a:latin typeface="Arial" panose="020B0604020202020204" pitchFamily="34" charset="0"/>
-                <a:cs typeface="Arial" panose="020B0604020202020204" pitchFamily="34" charset="0"/>
-              </a:rPr>
-              <a:t>Hardware</a:t>
-            </a:r>
-            <a:br>
-              <a:rPr lang="en-US" b="1" dirty="0">
-                <a:latin typeface="Arial" panose="020B0604020202020204" pitchFamily="34" charset="0"/>
-                <a:cs typeface="Arial" panose="020B0604020202020204" pitchFamily="34" charset="0"/>
-              </a:rPr>
-            </a:br>
-            <a:r>
-              <a:rPr lang="en-US" b="1" dirty="0" err="1">
-                <a:latin typeface="Arial" panose="020B0604020202020204" pitchFamily="34" charset="0"/>
-                <a:cs typeface="Arial" panose="020B0604020202020204" pitchFamily="34" charset="0"/>
-              </a:rPr>
-              <a:t>InfluxDB</a:t>
-            </a:r>
-            <a:br>
-              <a:rPr lang="en-US" b="1" dirty="0">
-                <a:latin typeface="Arial" panose="020B0604020202020204" pitchFamily="34" charset="0"/>
-                <a:cs typeface="Arial" panose="020B0604020202020204" pitchFamily="34" charset="0"/>
-              </a:rPr>
-            </a:br>
-            <a:r>
-              <a:rPr lang="en-US" b="1" dirty="0">
-                <a:latin typeface="Arial" panose="020B0604020202020204" pitchFamily="34" charset="0"/>
-                <a:cs typeface="Arial" panose="020B0604020202020204" pitchFamily="34" charset="0"/>
-              </a:rPr>
-              <a:t>Python </a:t>
-            </a:r>
-            <a:r>
-              <a:rPr lang="en-US" b="1" dirty="0" err="1">
-                <a:latin typeface="Arial" panose="020B0604020202020204" pitchFamily="34" charset="0"/>
-                <a:cs typeface="Arial" panose="020B0604020202020204" pitchFamily="34" charset="0"/>
-              </a:rPr>
-              <a:t>Programm</a:t>
-            </a:r>
-            <a:br>
-              <a:rPr lang="en-US" b="1" dirty="0">
-                <a:latin typeface="Arial" panose="020B0604020202020204" pitchFamily="34" charset="0"/>
-                <a:cs typeface="Arial" panose="020B0604020202020204" pitchFamily="34" charset="0"/>
-              </a:rPr>
-            </a:br>
-            <a:r>
-              <a:rPr lang="en-US" b="1" dirty="0">
-                <a:latin typeface="Arial" panose="020B0604020202020204" pitchFamily="34" charset="0"/>
-                <a:cs typeface="Arial" panose="020B0604020202020204" pitchFamily="34" charset="0"/>
-              </a:rPr>
-              <a:t>Flask Webserver</a:t>
-            </a:r>
-            <a:br>
-              <a:rPr lang="en-US" b="1" dirty="0">
-                <a:latin typeface="Arial" panose="020B0604020202020204" pitchFamily="34" charset="0"/>
-                <a:cs typeface="Arial" panose="020B0604020202020204" pitchFamily="34" charset="0"/>
-              </a:rPr>
-            </a:br>
-            <a:r>
-              <a:rPr lang="en-US" b="1" dirty="0">
-                <a:highlight>
-                  <a:srgbClr val="FAE800"/>
-                </a:highlight>
-                <a:latin typeface="Arial" panose="020B0604020202020204" pitchFamily="34" charset="0"/>
-                <a:cs typeface="Arial" panose="020B0604020202020204" pitchFamily="34" charset="0"/>
-              </a:rPr>
-              <a:t>GUI Sketch</a:t>
-            </a:r>
-            <a:br>
-              <a:rPr lang="en-US" b="1" dirty="0">
-                <a:latin typeface="Arial" panose="020B0604020202020204" pitchFamily="34" charset="0"/>
-                <a:cs typeface="Arial" panose="020B0604020202020204" pitchFamily="34" charset="0"/>
-              </a:rPr>
-            </a:br>
-            <a:r>
-              <a:rPr lang="en-US" b="1" dirty="0" err="1">
-                <a:latin typeface="Arial" panose="020B0604020202020204" pitchFamily="34" charset="0"/>
-                <a:cs typeface="Arial" panose="020B0604020202020204" pitchFamily="34" charset="0"/>
-              </a:rPr>
-              <a:t>Endresultat</a:t>
-            </a:r>
-            <a:br>
-              <a:rPr lang="en-US" b="1" dirty="0">
-                <a:latin typeface="Arial" panose="020B0604020202020204" pitchFamily="34" charset="0"/>
-                <a:cs typeface="Arial" panose="020B0604020202020204" pitchFamily="34" charset="0"/>
-              </a:rPr>
-            </a:br>
-            <a:r>
-              <a:rPr lang="en-US" b="1" dirty="0" err="1">
-                <a:latin typeface="Arial" panose="020B0604020202020204" pitchFamily="34" charset="0"/>
-                <a:cs typeface="Arial" panose="020B0604020202020204" pitchFamily="34" charset="0"/>
-              </a:rPr>
-              <a:t>Weiterentwicklung</a:t>
-            </a:r>
-            <a:endParaRPr lang="en-CH" b="1" dirty="0">
-              <a:latin typeface="Arial" panose="020B0604020202020204" pitchFamily="34" charset="0"/>
-              <a:cs typeface="Arial" panose="020B0604020202020204" pitchFamily="34" charset="0"/>
-            </a:endParaRPr>
-          </a:p>
-        </p:txBody>
-      </p:sp>
-      <p:sp>
-        <p:nvSpPr>
-          <p:cNvPr id="8" name="Slide Number Placeholder 7">
-            <a:extLst>
-              <a:ext uri="{FF2B5EF4-FFF2-40B4-BE49-F238E27FC236}">
-                <a16:creationId xmlns:a16="http://schemas.microsoft.com/office/drawing/2014/main" id="{E5E3E861-4688-44FC-A05E-E446522B24DD}"/>
-              </a:ext>
-            </a:extLst>
-          </p:cNvPr>
-          <p:cNvSpPr>
-            <a:spLocks noGrp="1"/>
-          </p:cNvSpPr>
-          <p:nvPr>
-            <p:ph type="sldNum" sz="quarter" idx="12"/>
-          </p:nvPr>
-        </p:nvSpPr>
-        <p:spPr/>
-        <p:txBody>
-          <a:bodyPr/>
-          <a:lstStyle/>
-          <a:p>
-            <a:fld id="{0F00D740-55B1-4DC8-A3B5-4535950A93D0}" type="slidenum">
-              <a:rPr lang="en-CH" smtClean="0"/>
-              <a:t>29</a:t>
-            </a:fld>
-            <a:endParaRPr lang="en-CH"/>
-          </a:p>
-        </p:txBody>
-      </p:sp>
-    </p:spTree>
-    <p:extLst>
-      <p:ext uri="{BB962C8B-B14F-4D97-AF65-F5344CB8AC3E}">
-        <p14:creationId xmlns:p14="http://schemas.microsoft.com/office/powerpoint/2010/main" val="2421134764"/>
-      </p:ext>
-    </p:extLst>
-  </p:cSld>
-  <p:clrMapOvr>
-    <a:masterClrMapping/>
-  </p:clrMapOvr>
-  <mc:AlternateContent xmlns:mc="http://schemas.openxmlformats.org/markup-compatibility/2006" xmlns:p14="http://schemas.microsoft.com/office/powerpoint/2010/main">
-    <mc:Choice Requires="p14">
-      <p:transition spd="med" p14:dur="700">
-        <p:fade/>
-      </p:transition>
-    </mc:Choice>
-    <mc:Fallback xmlns="">
-      <p:transition spd="med">
-        <p:fade/>
-      </p:transition>
-    </mc:Fallback>
-  </mc:AlternateContent>
-</p:sld>
-</file>
-
 <file path=ppt/slides/slide3.xml><?xml version="1.0" encoding="utf-8"?>
 <p:sld xmlns:a="http://schemas.openxmlformats.org/drawingml/2006/main" xmlns:r="http://schemas.openxmlformats.org/officeDocument/2006/relationships" xmlns:p="http://schemas.openxmlformats.org/presentationml/2006/main">
   <p:cSld>
@@ -16716,6 +16945,228 @@
           <p:cNvPr id="2" name="Title 1">
             <a:extLst>
               <a:ext uri="{FF2B5EF4-FFF2-40B4-BE49-F238E27FC236}">
+                <a16:creationId xmlns:a16="http://schemas.microsoft.com/office/drawing/2014/main" id="{F1AE8F4F-038B-4ABA-A89F-CA33847A9E12}"/>
+              </a:ext>
+            </a:extLst>
+          </p:cNvPr>
+          <p:cNvSpPr>
+            <a:spLocks noGrp="1"/>
+          </p:cNvSpPr>
+          <p:nvPr>
+            <p:ph type="title"/>
+          </p:nvPr>
+        </p:nvSpPr>
+        <p:spPr>
+          <a:xfrm>
+            <a:off x="838200" y="365125"/>
+            <a:ext cx="10515600" cy="5702300"/>
+          </a:xfrm>
+        </p:spPr>
+        <p:txBody>
+          <a:bodyPr>
+            <a:normAutofit fontScale="90000"/>
+          </a:bodyPr>
+          <a:lstStyle/>
+          <a:p>
+            <a:pPr algn="ctr">
+              <a:lnSpc>
+                <a:spcPct val="125000"/>
+              </a:lnSpc>
+              <a:spcBef>
+                <a:spcPts val="0"/>
+              </a:spcBef>
+            </a:pPr>
+            <a:r>
+              <a:rPr lang="en-US" b="1" dirty="0" err="1">
+                <a:latin typeface="Arial" panose="020B0604020202020204" pitchFamily="34" charset="0"/>
+                <a:cs typeface="Arial" panose="020B0604020202020204" pitchFamily="34" charset="0"/>
+              </a:rPr>
+              <a:t>Auftrag</a:t>
+            </a:r>
+            <a:br>
+              <a:rPr lang="en-US" b="1" dirty="0">
+                <a:latin typeface="Arial" panose="020B0604020202020204" pitchFamily="34" charset="0"/>
+                <a:cs typeface="Arial" panose="020B0604020202020204" pitchFamily="34" charset="0"/>
+              </a:rPr>
+            </a:br>
+            <a:r>
+              <a:rPr lang="en-US" b="1" dirty="0">
+                <a:latin typeface="Arial" panose="020B0604020202020204" pitchFamily="34" charset="0"/>
+                <a:cs typeface="Arial" panose="020B0604020202020204" pitchFamily="34" charset="0"/>
+              </a:rPr>
+              <a:t>Hardware</a:t>
+            </a:r>
+            <a:br>
+              <a:rPr lang="en-US" b="1" dirty="0">
+                <a:latin typeface="Arial" panose="020B0604020202020204" pitchFamily="34" charset="0"/>
+                <a:cs typeface="Arial" panose="020B0604020202020204" pitchFamily="34" charset="0"/>
+              </a:rPr>
+            </a:br>
+            <a:r>
+              <a:rPr lang="en-US" b="1" dirty="0" err="1">
+                <a:latin typeface="Arial" panose="020B0604020202020204" pitchFamily="34" charset="0"/>
+                <a:cs typeface="Arial" panose="020B0604020202020204" pitchFamily="34" charset="0"/>
+              </a:rPr>
+              <a:t>InfluxDB</a:t>
+            </a:r>
+            <a:br>
+              <a:rPr lang="en-US" b="1" dirty="0">
+                <a:latin typeface="Arial" panose="020B0604020202020204" pitchFamily="34" charset="0"/>
+                <a:cs typeface="Arial" panose="020B0604020202020204" pitchFamily="34" charset="0"/>
+              </a:rPr>
+            </a:br>
+            <a:r>
+              <a:rPr lang="en-US" b="1" dirty="0">
+                <a:latin typeface="Arial" panose="020B0604020202020204" pitchFamily="34" charset="0"/>
+                <a:cs typeface="Arial" panose="020B0604020202020204" pitchFamily="34" charset="0"/>
+              </a:rPr>
+              <a:t>Python </a:t>
+            </a:r>
+            <a:r>
+              <a:rPr lang="en-US" b="1" dirty="0" err="1">
+                <a:latin typeface="Arial" panose="020B0604020202020204" pitchFamily="34" charset="0"/>
+                <a:cs typeface="Arial" panose="020B0604020202020204" pitchFamily="34" charset="0"/>
+              </a:rPr>
+              <a:t>Programm</a:t>
+            </a:r>
+            <a:br>
+              <a:rPr lang="en-US" b="1" dirty="0">
+                <a:latin typeface="Arial" panose="020B0604020202020204" pitchFamily="34" charset="0"/>
+                <a:cs typeface="Arial" panose="020B0604020202020204" pitchFamily="34" charset="0"/>
+              </a:rPr>
+            </a:br>
+            <a:r>
+              <a:rPr lang="en-US" b="1" dirty="0">
+                <a:latin typeface="Arial" panose="020B0604020202020204" pitchFamily="34" charset="0"/>
+                <a:cs typeface="Arial" panose="020B0604020202020204" pitchFamily="34" charset="0"/>
+              </a:rPr>
+              <a:t>Flask Webserver</a:t>
+            </a:r>
+            <a:br>
+              <a:rPr lang="en-US" b="1" dirty="0">
+                <a:latin typeface="Arial" panose="020B0604020202020204" pitchFamily="34" charset="0"/>
+                <a:cs typeface="Arial" panose="020B0604020202020204" pitchFamily="34" charset="0"/>
+              </a:rPr>
+            </a:br>
+            <a:r>
+              <a:rPr lang="en-US" b="1" dirty="0">
+                <a:highlight>
+                  <a:srgbClr val="FAE800"/>
+                </a:highlight>
+                <a:latin typeface="Arial" panose="020B0604020202020204" pitchFamily="34" charset="0"/>
+                <a:cs typeface="Arial" panose="020B0604020202020204" pitchFamily="34" charset="0"/>
+              </a:rPr>
+              <a:t>GUI Sketch</a:t>
+            </a:r>
+            <a:br>
+              <a:rPr lang="en-US" b="1" dirty="0">
+                <a:latin typeface="Arial" panose="020B0604020202020204" pitchFamily="34" charset="0"/>
+                <a:cs typeface="Arial" panose="020B0604020202020204" pitchFamily="34" charset="0"/>
+              </a:rPr>
+            </a:br>
+            <a:r>
+              <a:rPr lang="en-US" b="1" dirty="0" err="1">
+                <a:latin typeface="Arial" panose="020B0604020202020204" pitchFamily="34" charset="0"/>
+                <a:cs typeface="Arial" panose="020B0604020202020204" pitchFamily="34" charset="0"/>
+              </a:rPr>
+              <a:t>Endresultat</a:t>
+            </a:r>
+            <a:br>
+              <a:rPr lang="en-US" b="1" dirty="0">
+                <a:latin typeface="Arial" panose="020B0604020202020204" pitchFamily="34" charset="0"/>
+                <a:cs typeface="Arial" panose="020B0604020202020204" pitchFamily="34" charset="0"/>
+              </a:rPr>
+            </a:br>
+            <a:r>
+              <a:rPr lang="en-US" b="1" dirty="0" err="1">
+                <a:latin typeface="Arial" panose="020B0604020202020204" pitchFamily="34" charset="0"/>
+                <a:cs typeface="Arial" panose="020B0604020202020204" pitchFamily="34" charset="0"/>
+              </a:rPr>
+              <a:t>Weiterentwicklung</a:t>
+            </a:r>
+            <a:endParaRPr lang="en-CH" b="1" dirty="0">
+              <a:latin typeface="Arial" panose="020B0604020202020204" pitchFamily="34" charset="0"/>
+              <a:cs typeface="Arial" panose="020B0604020202020204" pitchFamily="34" charset="0"/>
+            </a:endParaRPr>
+          </a:p>
+        </p:txBody>
+      </p:sp>
+      <p:sp>
+        <p:nvSpPr>
+          <p:cNvPr id="8" name="Slide Number Placeholder 7">
+            <a:extLst>
+              <a:ext uri="{FF2B5EF4-FFF2-40B4-BE49-F238E27FC236}">
+                <a16:creationId xmlns:a16="http://schemas.microsoft.com/office/drawing/2014/main" id="{E5E3E861-4688-44FC-A05E-E446522B24DD}"/>
+              </a:ext>
+            </a:extLst>
+          </p:cNvPr>
+          <p:cNvSpPr>
+            <a:spLocks noGrp="1"/>
+          </p:cNvSpPr>
+          <p:nvPr>
+            <p:ph type="sldNum" sz="quarter" idx="12"/>
+          </p:nvPr>
+        </p:nvSpPr>
+        <p:spPr/>
+        <p:txBody>
+          <a:bodyPr/>
+          <a:lstStyle/>
+          <a:p>
+            <a:fld id="{0F00D740-55B1-4DC8-A3B5-4535950A93D0}" type="slidenum">
+              <a:rPr lang="en-CH" smtClean="0"/>
+              <a:t>30</a:t>
+            </a:fld>
+            <a:endParaRPr lang="en-CH"/>
+          </a:p>
+        </p:txBody>
+      </p:sp>
+    </p:spTree>
+    <p:extLst>
+      <p:ext uri="{BB962C8B-B14F-4D97-AF65-F5344CB8AC3E}">
+        <p14:creationId xmlns:p14="http://schemas.microsoft.com/office/powerpoint/2010/main" val="2421134764"/>
+      </p:ext>
+    </p:extLst>
+  </p:cSld>
+  <p:clrMapOvr>
+    <a:masterClrMapping/>
+  </p:clrMapOvr>
+  <mc:AlternateContent xmlns:mc="http://schemas.openxmlformats.org/markup-compatibility/2006" xmlns:p14="http://schemas.microsoft.com/office/powerpoint/2010/main">
+    <mc:Choice Requires="p14">
+      <p:transition spd="med" p14:dur="700">
+        <p:fade/>
+      </p:transition>
+    </mc:Choice>
+    <mc:Fallback xmlns="">
+      <p:transition spd="med">
+        <p:fade/>
+      </p:transition>
+    </mc:Fallback>
+  </mc:AlternateContent>
+</p:sld>
+</file>
+
+<file path=ppt/slides/slide31.xml><?xml version="1.0" encoding="utf-8"?>
+<p:sld xmlns:a="http://schemas.openxmlformats.org/drawingml/2006/main" xmlns:r="http://schemas.openxmlformats.org/officeDocument/2006/relationships" xmlns:p="http://schemas.openxmlformats.org/presentationml/2006/main">
+  <p:cSld>
+    <p:spTree>
+      <p:nvGrpSpPr>
+        <p:cNvPr id="1" name=""/>
+        <p:cNvGrpSpPr/>
+        <p:nvPr/>
+      </p:nvGrpSpPr>
+      <p:grpSpPr>
+        <a:xfrm>
+          <a:off x="0" y="0"/>
+          <a:ext cx="0" cy="0"/>
+          <a:chOff x="0" y="0"/>
+          <a:chExt cx="0" cy="0"/>
+        </a:xfrm>
+      </p:grpSpPr>
+      <p:sp>
+        <p:nvSpPr>
+          <p:cNvPr id="2" name="Title 1">
+            <a:extLst>
+              <a:ext uri="{FF2B5EF4-FFF2-40B4-BE49-F238E27FC236}">
                 <a16:creationId xmlns:a16="http://schemas.microsoft.com/office/drawing/2014/main" id="{4808087A-40EC-41E6-A246-BC46343A4BFC}"/>
               </a:ext>
             </a:extLst>
@@ -16823,7 +17274,7 @@
           <a:p>
             <a:fld id="{0F00D740-55B1-4DC8-A3B5-4535950A93D0}" type="slidenum">
               <a:rPr lang="en-CH" smtClean="0"/>
-              <a:t>30</a:t>
+              <a:t>31</a:t>
             </a:fld>
             <a:endParaRPr lang="en-CH"/>
           </a:p>
@@ -17007,7 +17458,7 @@
 </p:sld>
 </file>
 
-<file path=ppt/slides/slide31.xml><?xml version="1.0" encoding="utf-8"?>
+<file path=ppt/slides/slide32.xml><?xml version="1.0" encoding="utf-8"?>
 <p:sld xmlns:a="http://schemas.openxmlformats.org/drawingml/2006/main" xmlns:r="http://schemas.openxmlformats.org/officeDocument/2006/relationships" xmlns:p="http://schemas.openxmlformats.org/presentationml/2006/main">
   <p:cSld>
     <p:spTree>
@@ -17136,7 +17587,7 @@
           <a:p>
             <a:fld id="{0F00D740-55B1-4DC8-A3B5-4535950A93D0}" type="slidenum">
               <a:rPr lang="en-CH" smtClean="0"/>
-              <a:t>31</a:t>
+              <a:t>32</a:t>
             </a:fld>
             <a:endParaRPr lang="en-CH"/>
           </a:p>
@@ -17320,7 +17771,7 @@
 </p:sld>
 </file>
 
-<file path=ppt/slides/slide32.xml><?xml version="1.0" encoding="utf-8"?>
+<file path=ppt/slides/slide33.xml><?xml version="1.0" encoding="utf-8"?>
 <p:sld xmlns:a="http://schemas.openxmlformats.org/drawingml/2006/main" xmlns:r="http://schemas.openxmlformats.org/officeDocument/2006/relationships" xmlns:p="http://schemas.openxmlformats.org/presentationml/2006/main">
   <p:cSld>
     <p:spTree>
@@ -17449,7 +17900,7 @@
           <a:p>
             <a:fld id="{0F00D740-55B1-4DC8-A3B5-4535950A93D0}" type="slidenum">
               <a:rPr lang="en-CH" smtClean="0"/>
-              <a:t>32</a:t>
+              <a:t>33</a:t>
             </a:fld>
             <a:endParaRPr lang="en-CH"/>
           </a:p>
@@ -17633,7 +18084,7 @@
 </p:sld>
 </file>
 
-<file path=ppt/slides/slide33.xml><?xml version="1.0" encoding="utf-8"?>
+<file path=ppt/slides/slide34.xml><?xml version="1.0" encoding="utf-8"?>
 <p:sld xmlns:a="http://schemas.openxmlformats.org/drawingml/2006/main" xmlns:r="http://schemas.openxmlformats.org/officeDocument/2006/relationships" xmlns:p="http://schemas.openxmlformats.org/presentationml/2006/main">
   <p:cSld>
     <p:spTree>
@@ -17824,7 +18275,7 @@
           <a:p>
             <a:fld id="{0F00D740-55B1-4DC8-A3B5-4535950A93D0}" type="slidenum">
               <a:rPr lang="en-CH" smtClean="0"/>
-              <a:t>33</a:t>
+              <a:t>34</a:t>
             </a:fld>
             <a:endParaRPr lang="en-CH"/>
           </a:p>
@@ -17855,7 +18306,7 @@
 </p:sld>
 </file>
 
-<file path=ppt/slides/slide34.xml><?xml version="1.0" encoding="utf-8"?>
+<file path=ppt/slides/slide35.xml><?xml version="1.0" encoding="utf-8"?>
 <p:sld xmlns:a="http://schemas.openxmlformats.org/drawingml/2006/main" xmlns:r="http://schemas.openxmlformats.org/officeDocument/2006/relationships" xmlns:p="http://schemas.openxmlformats.org/presentationml/2006/main">
   <p:cSld>
     <p:spTree>
@@ -17942,7 +18393,7 @@
           <a:p>
             <a:fld id="{0F00D740-55B1-4DC8-A3B5-4535950A93D0}" type="slidenum">
               <a:rPr lang="en-CH" smtClean="0"/>
-              <a:t>34</a:t>
+              <a:t>35</a:t>
             </a:fld>
             <a:endParaRPr lang="en-CH"/>
           </a:p>
@@ -18452,7 +18903,7 @@
 </p:sld>
 </file>
 
-<file path=ppt/slides/slide35.xml><?xml version="1.0" encoding="utf-8"?>
+<file path=ppt/slides/slide36.xml><?xml version="1.0" encoding="utf-8"?>
 <p:sld xmlns:a="http://schemas.openxmlformats.org/drawingml/2006/main" xmlns:r="http://schemas.openxmlformats.org/officeDocument/2006/relationships" xmlns:p="http://schemas.openxmlformats.org/presentationml/2006/main">
   <p:cSld>
     <p:spTree>
@@ -18646,7 +19097,7 @@
           <a:p>
             <a:fld id="{0F00D740-55B1-4DC8-A3B5-4535950A93D0}" type="slidenum">
               <a:rPr lang="en-CH" smtClean="0"/>
-              <a:t>35</a:t>
+              <a:t>36</a:t>
             </a:fld>
             <a:endParaRPr lang="en-CH"/>
           </a:p>
@@ -18677,7 +19128,7 @@
 </p:sld>
 </file>
 
-<file path=ppt/slides/slide36.xml><?xml version="1.0" encoding="utf-8"?>
+<file path=ppt/slides/slide37.xml><?xml version="1.0" encoding="utf-8"?>
 <p:sld xmlns:a="http://schemas.openxmlformats.org/drawingml/2006/main" xmlns:r="http://schemas.openxmlformats.org/officeDocument/2006/relationships" xmlns:p="http://schemas.openxmlformats.org/presentationml/2006/main">
   <p:cSld>
     <p:spTree>
@@ -18890,7 +19341,7 @@
           <a:p>
             <a:fld id="{0F00D740-55B1-4DC8-A3B5-4535950A93D0}" type="slidenum">
               <a:rPr lang="en-CH" smtClean="0"/>
-              <a:t>36</a:t>
+              <a:t>37</a:t>
             </a:fld>
             <a:endParaRPr lang="en-CH"/>
           </a:p>
@@ -19074,7 +19525,7 @@
 </p:sld>
 </file>
 
-<file path=ppt/slides/slide37.xml><?xml version="1.0" encoding="utf-8"?>
+<file path=ppt/slides/slide38.xml><?xml version="1.0" encoding="utf-8"?>
 <p:sld xmlns:a="http://schemas.openxmlformats.org/drawingml/2006/main" xmlns:r="http://schemas.openxmlformats.org/officeDocument/2006/relationships" xmlns:p="http://schemas.openxmlformats.org/presentationml/2006/main">
   <p:cSld>
     <p:spTree>
@@ -19387,7 +19838,7 @@
               <a:t>			Sean Corrigan 		</a:t>
             </a:r>
             <a:r>
-              <a:rPr lang="en-US" sz="1600" dirty="0">
+              <a:rPr lang="en-US" dirty="0">
                 <a:latin typeface="Arial" panose="020B0604020202020204" pitchFamily="34" charset="0"/>
                 <a:cs typeface="Arial" panose="020B0604020202020204" pitchFamily="34" charset="0"/>
               </a:rPr>
@@ -19750,7 +20201,7 @@
             </a:r>
             <a:r>
               <a:rPr lang="en-US" dirty="0" err="1"/>
-              <a:t>Seegeclub</a:t>
+              <a:t>Seegelclub</a:t>
             </a:r>
             <a:r>
               <a:rPr lang="en-US" dirty="0"/>

</xml_diff>